<commit_message>
V 0.9Build9 preRel Update - add conversion of AITraffic files to scripts - update Refacture Scripting classes and modes for AIT conversions - update GUI and settings for conversion of AIT files - fix Sim Model issues with GS=0 - fix Wrong entries in Aircraft Selections
</commit_message>
<xml_diff>
--- a/Doc/XPVTdesign.pptx
+++ b/Doc/XPVTdesign.pptx
@@ -9,10 +9,11 @@
     <p:sldId id="258" r:id="rId3"/>
     <p:sldId id="257" r:id="rId4"/>
     <p:sldId id="261" r:id="rId5"/>
-    <p:sldId id="262" r:id="rId6"/>
-    <p:sldId id="260" r:id="rId7"/>
-    <p:sldId id="264" r:id="rId8"/>
-    <p:sldId id="263" r:id="rId9"/>
+    <p:sldId id="265" r:id="rId6"/>
+    <p:sldId id="262" r:id="rId7"/>
+    <p:sldId id="260" r:id="rId8"/>
+    <p:sldId id="264" r:id="rId9"/>
+    <p:sldId id="263" r:id="rId10"/>
   </p:sldIdLst>
   <p:sldSz cx="12192000" cy="6858000"/>
   <p:notesSz cx="6858000" cy="9144000"/>
@@ -250,7 +251,7 @@
           <a:p>
             <a:fld id="{B50B3930-9261-4D85-8D3B-937F72F28A85}" type="datetimeFigureOut">
               <a:rPr lang="de-CH" smtClean="0"/>
-              <a:t>12.07.2020</a:t>
+              <a:t>23.07.2020</a:t>
             </a:fld>
             <a:endParaRPr lang="de-CH"/>
           </a:p>
@@ -420,7 +421,7 @@
           <a:p>
             <a:fld id="{B50B3930-9261-4D85-8D3B-937F72F28A85}" type="datetimeFigureOut">
               <a:rPr lang="de-CH" smtClean="0"/>
-              <a:t>12.07.2020</a:t>
+              <a:t>23.07.2020</a:t>
             </a:fld>
             <a:endParaRPr lang="de-CH"/>
           </a:p>
@@ -600,7 +601,7 @@
           <a:p>
             <a:fld id="{B50B3930-9261-4D85-8D3B-937F72F28A85}" type="datetimeFigureOut">
               <a:rPr lang="de-CH" smtClean="0"/>
-              <a:t>12.07.2020</a:t>
+              <a:t>23.07.2020</a:t>
             </a:fld>
             <a:endParaRPr lang="de-CH"/>
           </a:p>
@@ -770,7 +771,7 @@
           <a:p>
             <a:fld id="{B50B3930-9261-4D85-8D3B-937F72F28A85}" type="datetimeFigureOut">
               <a:rPr lang="de-CH" smtClean="0"/>
-              <a:t>12.07.2020</a:t>
+              <a:t>23.07.2020</a:t>
             </a:fld>
             <a:endParaRPr lang="de-CH"/>
           </a:p>
@@ -1016,7 +1017,7 @@
           <a:p>
             <a:fld id="{B50B3930-9261-4D85-8D3B-937F72F28A85}" type="datetimeFigureOut">
               <a:rPr lang="de-CH" smtClean="0"/>
-              <a:t>12.07.2020</a:t>
+              <a:t>23.07.2020</a:t>
             </a:fld>
             <a:endParaRPr lang="de-CH"/>
           </a:p>
@@ -1248,7 +1249,7 @@
           <a:p>
             <a:fld id="{B50B3930-9261-4D85-8D3B-937F72F28A85}" type="datetimeFigureOut">
               <a:rPr lang="de-CH" smtClean="0"/>
-              <a:t>12.07.2020</a:t>
+              <a:t>23.07.2020</a:t>
             </a:fld>
             <a:endParaRPr lang="de-CH"/>
           </a:p>
@@ -1615,7 +1616,7 @@
           <a:p>
             <a:fld id="{B50B3930-9261-4D85-8D3B-937F72F28A85}" type="datetimeFigureOut">
               <a:rPr lang="de-CH" smtClean="0"/>
-              <a:t>12.07.2020</a:t>
+              <a:t>23.07.2020</a:t>
             </a:fld>
             <a:endParaRPr lang="de-CH"/>
           </a:p>
@@ -1733,7 +1734,7 @@
           <a:p>
             <a:fld id="{B50B3930-9261-4D85-8D3B-937F72F28A85}" type="datetimeFigureOut">
               <a:rPr lang="de-CH" smtClean="0"/>
-              <a:t>12.07.2020</a:t>
+              <a:t>23.07.2020</a:t>
             </a:fld>
             <a:endParaRPr lang="de-CH"/>
           </a:p>
@@ -1828,7 +1829,7 @@
           <a:p>
             <a:fld id="{B50B3930-9261-4D85-8D3B-937F72F28A85}" type="datetimeFigureOut">
               <a:rPr lang="de-CH" smtClean="0"/>
-              <a:t>12.07.2020</a:t>
+              <a:t>23.07.2020</a:t>
             </a:fld>
             <a:endParaRPr lang="de-CH"/>
           </a:p>
@@ -2105,7 +2106,7 @@
           <a:p>
             <a:fld id="{B50B3930-9261-4D85-8D3B-937F72F28A85}" type="datetimeFigureOut">
               <a:rPr lang="de-CH" smtClean="0"/>
-              <a:t>12.07.2020</a:t>
+              <a:t>23.07.2020</a:t>
             </a:fld>
             <a:endParaRPr lang="de-CH"/>
           </a:p>
@@ -2358,7 +2359,7 @@
           <a:p>
             <a:fld id="{B50B3930-9261-4D85-8D3B-937F72F28A85}" type="datetimeFigureOut">
               <a:rPr lang="de-CH" smtClean="0"/>
-              <a:t>12.07.2020</a:t>
+              <a:t>23.07.2020</a:t>
             </a:fld>
             <a:endParaRPr lang="de-CH"/>
           </a:p>
@@ -2571,7 +2572,7 @@
           <a:p>
             <a:fld id="{B50B3930-9261-4D85-8D3B-937F72F28A85}" type="datetimeFigureOut">
               <a:rPr lang="de-CH" smtClean="0"/>
-              <a:t>12.07.2020</a:t>
+              <a:t>23.07.2020</a:t>
             </a:fld>
             <a:endParaRPr lang="de-CH"/>
           </a:p>
@@ -2993,11 +2994,7 @@
           <a:p>
             <a:r>
               <a:rPr lang="de-CH" dirty="0" smtClean="0"/>
-              <a:t>X Plane Virtual </a:t>
-            </a:r>
-            <a:r>
-              <a:rPr lang="de-CH" dirty="0" smtClean="0"/>
-              <a:t>Traffic</a:t>
+              <a:t>X Plane Virtual Traffic</a:t>
             </a:r>
             <a:br>
               <a:rPr lang="de-CH" dirty="0" smtClean="0"/>
@@ -8645,7 +8642,7 @@
         <p:spPr>
           <a:xfrm>
             <a:off x="219541" y="179521"/>
-            <a:ext cx="3259162" cy="369332"/>
+            <a:ext cx="2843984" cy="369332"/>
           </a:xfrm>
           <a:prstGeom prst="rect">
             <a:avLst/>
@@ -8660,7 +8657,7 @@
           <a:p>
             <a:r>
               <a:rPr lang="de-CH" dirty="0" smtClean="0"/>
-              <a:t>Virtual Traffic VFR </a:t>
+              <a:t>Virtual Traffic </a:t>
             </a:r>
             <a:r>
               <a:rPr lang="de-CH" dirty="0" err="1" smtClean="0"/>
@@ -8712,7 +8709,7 @@
         <p:spPr>
           <a:xfrm>
             <a:off x="219541" y="179521"/>
-            <a:ext cx="3259162" cy="369332"/>
+            <a:ext cx="1675459" cy="307777"/>
           </a:xfrm>
           <a:prstGeom prst="rect">
             <a:avLst/>
@@ -8726,8 +8723,8 @@
           <a:lstStyle/>
           <a:p>
             <a:r>
-              <a:rPr lang="en-US" dirty="0" smtClean="0"/>
-              <a:t>Virtual Traffic VFR Aircraft Model</a:t>
+              <a:rPr lang="en-US" sz="1400" dirty="0" smtClean="0"/>
+              <a:t>Virtual Traffic Flights</a:t>
             </a:r>
           </a:p>
         </p:txBody>
@@ -8740,8 +8737,8 @@
         </p:nvSpPr>
         <p:spPr>
           <a:xfrm>
-            <a:off x="189929" y="769246"/>
-            <a:ext cx="1659193" cy="369332"/>
+            <a:off x="449170" y="548853"/>
+            <a:ext cx="11342165" cy="1169551"/>
           </a:xfrm>
           <a:prstGeom prst="rect">
             <a:avLst/>
@@ -8755,305 +8752,48 @@
           <a:lstStyle/>
           <a:p>
             <a:r>
-              <a:rPr lang="en-US" dirty="0" smtClean="0"/>
-              <a:t>Commands</a:t>
-            </a:r>
-            <a:endParaRPr lang="en-US" dirty="0"/>
-          </a:p>
-        </p:txBody>
-      </p:sp>
-      <p:sp>
-        <p:nvSpPr>
-          <p:cNvPr id="4" name="Rechteck 3"/>
-          <p:cNvSpPr/>
-          <p:nvPr/>
-        </p:nvSpPr>
-        <p:spPr>
-          <a:xfrm>
-            <a:off x="294313" y="1694092"/>
-            <a:ext cx="5066726" cy="309150"/>
-          </a:xfrm>
-          <a:prstGeom prst="rect">
-            <a:avLst/>
-          </a:prstGeom>
-        </p:spPr>
-        <p:style>
-          <a:lnRef idx="2">
-            <a:schemeClr val="accent6">
-              <a:shade val="50000"/>
-            </a:schemeClr>
-          </a:lnRef>
-          <a:fillRef idx="1">
-            <a:schemeClr val="accent6"/>
-          </a:fillRef>
-          <a:effectRef idx="0">
-            <a:schemeClr val="accent6"/>
-          </a:effectRef>
-          <a:fontRef idx="minor">
-            <a:schemeClr val="lt1"/>
-          </a:fontRef>
-        </p:style>
-        <p:txBody>
-          <a:bodyPr rtlCol="0" anchor="t"/>
-          <a:lstStyle/>
-          <a:p>
-            <a:r>
-              <a:rPr lang="en-US" sz="1200" dirty="0" smtClean="0"/>
-              <a:t>A=</a:t>
-            </a:r>
-            <a:r>
-              <a:rPr lang="en-US" sz="1200" dirty="0" err="1" smtClean="0"/>
-              <a:t>AcftType</a:t>
-            </a:r>
-            <a:r>
-              <a:rPr lang="en-US" sz="1200" dirty="0" smtClean="0"/>
-              <a:t>;[</a:t>
-            </a:r>
-            <a:r>
-              <a:rPr lang="en-US" sz="1200" dirty="0" err="1" smtClean="0"/>
-              <a:t>runway_ID</a:t>
-            </a:r>
-            <a:r>
-              <a:rPr lang="en-US" sz="1200" dirty="0" smtClean="0"/>
-              <a:t>]  # an </a:t>
-            </a:r>
-            <a:r>
-              <a:rPr lang="en-US" sz="1200" dirty="0" err="1" smtClean="0"/>
-              <a:t>acft</a:t>
-            </a:r>
-            <a:r>
-              <a:rPr lang="en-US" sz="1200" dirty="0" smtClean="0"/>
-              <a:t> type and an optional runway id</a:t>
-            </a:r>
-            <a:endParaRPr lang="en-US" sz="1200" dirty="0"/>
-          </a:p>
-        </p:txBody>
-      </p:sp>
-      <p:sp>
-        <p:nvSpPr>
-          <p:cNvPr id="5" name="Rechteck 4"/>
-          <p:cNvSpPr/>
-          <p:nvPr/>
-        </p:nvSpPr>
-        <p:spPr>
-          <a:xfrm>
-            <a:off x="294313" y="2375606"/>
-            <a:ext cx="5066725" cy="309150"/>
-          </a:xfrm>
-          <a:prstGeom prst="rect">
-            <a:avLst/>
-          </a:prstGeom>
-        </p:spPr>
-        <p:style>
-          <a:lnRef idx="2">
-            <a:schemeClr val="accent1">
-              <a:shade val="50000"/>
-            </a:schemeClr>
-          </a:lnRef>
-          <a:fillRef idx="1">
-            <a:schemeClr val="accent1"/>
-          </a:fillRef>
-          <a:effectRef idx="0">
-            <a:schemeClr val="accent1"/>
-          </a:effectRef>
-          <a:fontRef idx="minor">
-            <a:schemeClr val="lt1"/>
-          </a:fontRef>
-        </p:style>
-        <p:txBody>
-          <a:bodyPr rtlCol="0" anchor="t"/>
-          <a:lstStyle/>
-          <a:p>
-            <a:r>
-              <a:rPr lang="en-US" sz="1200" dirty="0" smtClean="0"/>
-              <a:t>S=knots  # new TAS [</a:t>
-            </a:r>
-            <a:r>
-              <a:rPr lang="en-US" sz="1200" dirty="0" err="1" smtClean="0"/>
-              <a:t>kt</a:t>
-            </a:r>
-            <a:r>
-              <a:rPr lang="en-US" sz="1200" dirty="0" smtClean="0"/>
-              <a:t>] </a:t>
-            </a:r>
-            <a:r>
-              <a:rPr lang="en-US" sz="1200" dirty="0"/>
-              <a:t>starting at next </a:t>
-            </a:r>
-            <a:r>
-              <a:rPr lang="en-US" sz="1200" dirty="0" smtClean="0"/>
-              <a:t>segment (default 100kt)</a:t>
-            </a:r>
-            <a:endParaRPr lang="en-US" sz="1200" dirty="0"/>
-          </a:p>
-          <a:p>
-            <a:endParaRPr lang="en-US" sz="1200" dirty="0"/>
-          </a:p>
-        </p:txBody>
-      </p:sp>
-      <p:sp>
-        <p:nvSpPr>
-          <p:cNvPr id="6" name="Rechteck 5"/>
-          <p:cNvSpPr/>
-          <p:nvPr/>
-        </p:nvSpPr>
-        <p:spPr>
-          <a:xfrm>
-            <a:off x="294313" y="3381860"/>
-            <a:ext cx="5066725" cy="309150"/>
-          </a:xfrm>
-          <a:prstGeom prst="rect">
-            <a:avLst/>
-          </a:prstGeom>
-        </p:spPr>
-        <p:style>
-          <a:lnRef idx="2">
-            <a:schemeClr val="accent2">
-              <a:shade val="50000"/>
-            </a:schemeClr>
-          </a:lnRef>
-          <a:fillRef idx="1">
-            <a:schemeClr val="accent2"/>
-          </a:fillRef>
-          <a:effectRef idx="0">
-            <a:schemeClr val="accent2"/>
-          </a:effectRef>
-          <a:fontRef idx="minor">
-            <a:schemeClr val="lt1"/>
-          </a:fontRef>
-        </p:style>
-        <p:txBody>
-          <a:bodyPr rtlCol="0" anchor="t"/>
-          <a:lstStyle/>
-          <a:p>
-            <a:r>
-              <a:rPr lang="en-US" sz="1200" dirty="0" smtClean="0"/>
-              <a:t>D=</a:t>
-            </a:r>
-            <a:r>
-              <a:rPr lang="en-US" sz="1200" dirty="0" err="1" smtClean="0"/>
-              <a:t>dist</a:t>
-            </a:r>
-            <a:r>
-              <a:rPr lang="en-US" sz="1200" dirty="0" smtClean="0"/>
-              <a:t>  # a straight segment [nm]</a:t>
-            </a:r>
-            <a:endParaRPr lang="en-US" sz="1200" dirty="0"/>
-          </a:p>
-        </p:txBody>
-      </p:sp>
-      <p:sp>
-        <p:nvSpPr>
-          <p:cNvPr id="7" name="Rechteck 6"/>
-          <p:cNvSpPr/>
-          <p:nvPr/>
-        </p:nvSpPr>
-        <p:spPr>
-          <a:xfrm>
-            <a:off x="294313" y="3691010"/>
-            <a:ext cx="5066725" cy="309150"/>
-          </a:xfrm>
-          <a:prstGeom prst="rect">
-            <a:avLst/>
-          </a:prstGeom>
-        </p:spPr>
-        <p:style>
-          <a:lnRef idx="2">
-            <a:schemeClr val="accent2">
-              <a:shade val="50000"/>
-            </a:schemeClr>
-          </a:lnRef>
-          <a:fillRef idx="1">
-            <a:schemeClr val="accent2"/>
-          </a:fillRef>
-          <a:effectRef idx="0">
-            <a:schemeClr val="accent2"/>
-          </a:effectRef>
-          <a:fontRef idx="minor">
-            <a:schemeClr val="lt1"/>
-          </a:fontRef>
-        </p:style>
-        <p:txBody>
-          <a:bodyPr rtlCol="0" anchor="t"/>
-          <a:lstStyle/>
-          <a:p>
-            <a:r>
-              <a:rPr lang="en-US" sz="1200" dirty="0" smtClean="0"/>
-              <a:t>T=[+-]angle  # a turn segment [°] (abs &lt;=360)</a:t>
-            </a:r>
-            <a:endParaRPr lang="en-US" sz="1200" dirty="0"/>
-          </a:p>
-        </p:txBody>
-      </p:sp>
-      <p:sp>
-        <p:nvSpPr>
-          <p:cNvPr id="8" name="Rechteck 7"/>
-          <p:cNvSpPr/>
-          <p:nvPr/>
-        </p:nvSpPr>
-        <p:spPr>
-          <a:xfrm>
-            <a:off x="294313" y="2684756"/>
-            <a:ext cx="5066725" cy="309150"/>
-          </a:xfrm>
-          <a:prstGeom prst="rect">
-            <a:avLst/>
-          </a:prstGeom>
-        </p:spPr>
-        <p:style>
-          <a:lnRef idx="2">
-            <a:schemeClr val="accent1">
-              <a:shade val="50000"/>
-            </a:schemeClr>
-          </a:lnRef>
-          <a:fillRef idx="1">
-            <a:schemeClr val="accent1"/>
-          </a:fillRef>
-          <a:effectRef idx="0">
-            <a:schemeClr val="accent1"/>
-          </a:effectRef>
-          <a:fontRef idx="minor">
-            <a:schemeClr val="lt1"/>
-          </a:fontRef>
-        </p:style>
-        <p:txBody>
-          <a:bodyPr rtlCol="0" anchor="t"/>
-          <a:lstStyle/>
-          <a:p>
-            <a:r>
-              <a:rPr lang="en-US" sz="1200" dirty="0" smtClean="0"/>
-              <a:t>V=[+-]</a:t>
-            </a:r>
-            <a:r>
-              <a:rPr lang="en-US" sz="1200" dirty="0" err="1" smtClean="0"/>
-              <a:t>vs;agl</a:t>
-            </a:r>
-            <a:r>
-              <a:rPr lang="en-US" sz="1200" dirty="0" smtClean="0"/>
-              <a:t>  # ascent or descent @vs starting at next segment (</a:t>
-            </a:r>
-            <a:r>
-              <a:rPr lang="en-US" sz="1200" dirty="0" err="1" smtClean="0"/>
-              <a:t>def</a:t>
-            </a:r>
-            <a:r>
-              <a:rPr lang="en-US" sz="1200" dirty="0" smtClean="0"/>
-              <a:t> 0ft/Min)</a:t>
-            </a:r>
-            <a:endParaRPr lang="en-US" sz="1200" dirty="0"/>
-          </a:p>
-        </p:txBody>
-      </p:sp>
-      <p:sp>
-        <p:nvSpPr>
-          <p:cNvPr id="9" name="Textfeld 8"/>
+              <a:rPr lang="en-US" sz="1400" dirty="0" smtClean="0"/>
+              <a:t>Type1 - Runway Start:</a:t>
+            </a:r>
+          </a:p>
+          <a:p>
+            <a:r>
+              <a:rPr lang="en-US" sz="1400" dirty="0" smtClean="0"/>
+              <a:t>Flights are created from random chosen scripts at random airports within the observed range, at the start of a random runway using the </a:t>
+            </a:r>
+            <a:r>
+              <a:rPr lang="en-US" sz="1400" dirty="0" err="1" smtClean="0"/>
+              <a:t>rwy</a:t>
+            </a:r>
+            <a:r>
+              <a:rPr lang="en-US" sz="1400" dirty="0" smtClean="0"/>
+              <a:t> heading, the initial altitude is given by the runway elevation.</a:t>
+            </a:r>
+          </a:p>
+          <a:p>
+            <a:r>
+              <a:rPr lang="en-US" sz="1400" dirty="0" smtClean="0"/>
+              <a:t>Scripts may have a preferred runway to start from but get a random one if the preferred one is not in range.</a:t>
+            </a:r>
+          </a:p>
+          <a:p>
+            <a:r>
+              <a:rPr lang="en-US" sz="1400" dirty="0" smtClean="0"/>
+              <a:t>Scripts can be tied to the start runway, however if the runway is not in range such scripts are ignored.</a:t>
+            </a:r>
+          </a:p>
+        </p:txBody>
+      </p:sp>
+      <p:sp>
+        <p:nvSpPr>
+          <p:cNvPr id="4" name="Textfeld 3"/>
           <p:cNvSpPr txBox="1"/>
           <p:nvPr/>
         </p:nvSpPr>
         <p:spPr>
           <a:xfrm>
-            <a:off x="294314" y="1324760"/>
-            <a:ext cx="1659193" cy="369332"/>
+            <a:off x="449167" y="1718404"/>
+            <a:ext cx="11342165" cy="738664"/>
           </a:xfrm>
           <a:prstGeom prst="rect">
             <a:avLst/>
@@ -9067,23 +8807,28 @@
           <a:lstStyle/>
           <a:p>
             <a:r>
-              <a:rPr lang="en-US" dirty="0" smtClean="0"/>
-              <a:t>Create aircraft</a:t>
-            </a:r>
-            <a:endParaRPr lang="en-US" dirty="0"/>
-          </a:p>
-        </p:txBody>
-      </p:sp>
-      <p:sp>
-        <p:nvSpPr>
-          <p:cNvPr id="10" name="Textfeld 9"/>
+              <a:rPr lang="en-US" sz="1400" dirty="0" smtClean="0"/>
+              <a:t>Type 2 - Airborne Start – Airway based :</a:t>
+            </a:r>
+          </a:p>
+          <a:p>
+            <a:r>
+              <a:rPr lang="en-US" sz="1400" dirty="0" smtClean="0"/>
+              <a:t>Flights are created from ad hoc scripts created from the Airway Database, the initial altitude is randomly created from the airway level limits, initial speed as well. The route is created by connected segments at reasonable turns (&lt;150°), circular loops are avoided.</a:t>
+            </a:r>
+          </a:p>
+        </p:txBody>
+      </p:sp>
+      <p:sp>
+        <p:nvSpPr>
+          <p:cNvPr id="5" name="Textfeld 4"/>
           <p:cNvSpPr txBox="1"/>
           <p:nvPr/>
         </p:nvSpPr>
         <p:spPr>
           <a:xfrm>
-            <a:off x="294313" y="2021864"/>
-            <a:ext cx="1659193" cy="369332"/>
+            <a:off x="449164" y="2457068"/>
+            <a:ext cx="11342165" cy="1815882"/>
           </a:xfrm>
           <a:prstGeom prst="rect">
             <a:avLst/>
@@ -9097,23 +8842,85 @@
           <a:lstStyle/>
           <a:p>
             <a:r>
-              <a:rPr lang="en-US" dirty="0" smtClean="0"/>
-              <a:t>Conditions</a:t>
-            </a:r>
-            <a:endParaRPr lang="en-US" dirty="0"/>
-          </a:p>
-        </p:txBody>
-      </p:sp>
-      <p:sp>
-        <p:nvSpPr>
-          <p:cNvPr id="11" name="Textfeld 10"/>
+              <a:rPr lang="en-US" sz="1400" dirty="0" smtClean="0"/>
+              <a:t>Airborne Start – </a:t>
+            </a:r>
+            <a:r>
+              <a:rPr lang="en-US" sz="1400" dirty="0" err="1" smtClean="0"/>
+              <a:t>AITraffic</a:t>
+            </a:r>
+            <a:r>
+              <a:rPr lang="en-US" sz="1400" dirty="0" smtClean="0"/>
+              <a:t> recording based – relative and absolute:</a:t>
+            </a:r>
+          </a:p>
+          <a:p>
+            <a:r>
+              <a:rPr lang="en-US" sz="1400" dirty="0" smtClean="0"/>
+              <a:t>A list of </a:t>
+            </a:r>
+            <a:r>
+              <a:rPr lang="en-US" sz="1400" dirty="0" err="1" smtClean="0"/>
+              <a:t>AITraffic</a:t>
+            </a:r>
+            <a:r>
+              <a:rPr lang="en-US" sz="1400" dirty="0" smtClean="0"/>
+              <a:t> messages can be translated and stored as a script route.</a:t>
+            </a:r>
+          </a:p>
+          <a:p>
+            <a:r>
+              <a:rPr lang="en-US" sz="1400" dirty="0" smtClean="0"/>
+              <a:t>Such flights are created from random chosen scripts, the altitude and speed profile is set by the recorded messages.</a:t>
+            </a:r>
+            <a:br>
+              <a:rPr lang="en-US" sz="1400" dirty="0" smtClean="0"/>
+            </a:br>
+            <a:r>
+              <a:rPr lang="en-US" sz="1400" dirty="0" smtClean="0"/>
+              <a:t>The initial alt and speed and track is set from the first recorded message. </a:t>
+            </a:r>
+          </a:p>
+          <a:p>
+            <a:r>
+              <a:rPr lang="en-US" sz="1400" dirty="0"/>
+              <a:t>Type </a:t>
+            </a:r>
+            <a:r>
+              <a:rPr lang="en-US" sz="1400" dirty="0" smtClean="0"/>
+              <a:t>3  - Relative routes are translated into Turn and Heading commands to create a track. The initial position is created from a randomly chosen runway position.</a:t>
+            </a:r>
+          </a:p>
+          <a:p>
+            <a:r>
+              <a:rPr lang="en-US" sz="1400" dirty="0"/>
+              <a:t>Type 4 </a:t>
+            </a:r>
+            <a:r>
+              <a:rPr lang="en-US" sz="1400" dirty="0" smtClean="0"/>
+              <a:t>- Absolute routes are translated into </a:t>
+            </a:r>
+            <a:r>
+              <a:rPr lang="en-US" sz="1400" dirty="0" err="1" smtClean="0"/>
+              <a:t>Goto</a:t>
+            </a:r>
+            <a:r>
+              <a:rPr lang="en-US" sz="1400" dirty="0" smtClean="0"/>
+              <a:t> commands to create an absolute track following the original messages. If the origin (first message location) is not in range such scripts are ignored.</a:t>
+            </a:r>
+          </a:p>
+        </p:txBody>
+      </p:sp>
+      <p:sp>
+        <p:nvSpPr>
+          <p:cNvPr id="6" name="Textfeld 5"/>
           <p:cNvSpPr txBox="1"/>
           <p:nvPr/>
         </p:nvSpPr>
         <p:spPr>
           <a:xfrm>
-            <a:off x="294313" y="3003217"/>
-            <a:ext cx="1659193" cy="369332"/>
+            <a:off x="449161" y="4272950"/>
+            <a:ext cx="11342165" cy="954107"/>
           </a:xfrm>
           <a:prstGeom prst="rect">
             <a:avLst/>
@@ -9127,23 +8934,169 @@
           <a:lstStyle/>
           <a:p>
             <a:r>
-              <a:rPr lang="en-US" dirty="0" smtClean="0"/>
-              <a:t>Segments</a:t>
-            </a:r>
-            <a:endParaRPr lang="en-US" dirty="0"/>
-          </a:p>
-        </p:txBody>
-      </p:sp>
-      <p:sp>
-        <p:nvSpPr>
-          <p:cNvPr id="12" name="Textfeld 11"/>
+              <a:rPr lang="en-US" sz="1400" dirty="0" smtClean="0"/>
+              <a:t>A=</a:t>
+            </a:r>
+            <a:r>
+              <a:rPr lang="en-US" sz="1400" dirty="0" err="1" smtClean="0"/>
+              <a:t>AcftType;Runway</a:t>
+            </a:r>
+            <a:r>
+              <a:rPr lang="en-US" sz="1400" dirty="0" smtClean="0"/>
+              <a:t>[;</a:t>
+            </a:r>
+            <a:r>
+              <a:rPr lang="en-US" sz="1400" dirty="0" err="1" smtClean="0"/>
+              <a:t>Pref.Runway</a:t>
+            </a:r>
+            <a:r>
+              <a:rPr lang="en-US" sz="1400" dirty="0"/>
+              <a:t>[;Strict</a:t>
+            </a:r>
+            <a:r>
+              <a:rPr lang="en-US" sz="1400" dirty="0" smtClean="0"/>
+              <a:t>]]	# Type 1 – default Alt </a:t>
+            </a:r>
+            <a:r>
+              <a:rPr lang="en-US" sz="1400" dirty="0"/>
+              <a:t>Mode =&gt; </a:t>
+            </a:r>
+            <a:r>
+              <a:rPr lang="en-US" sz="1400" dirty="0" smtClean="0"/>
+              <a:t>AGL based</a:t>
+            </a:r>
+          </a:p>
+          <a:p>
+            <a:r>
+              <a:rPr lang="en-US" sz="1400" dirty="0" smtClean="0"/>
+              <a:t>A=</a:t>
+            </a:r>
+            <a:r>
+              <a:rPr lang="en-US" sz="1400" dirty="0" err="1" smtClean="0"/>
+              <a:t>AcftType;Airway</a:t>
+            </a:r>
+            <a:r>
+              <a:rPr lang="en-US" sz="1400" dirty="0" smtClean="0"/>
+              <a:t>	</a:t>
+            </a:r>
+            <a:r>
+              <a:rPr lang="en-US" sz="1400" dirty="0"/>
+              <a:t>		# Type </a:t>
+            </a:r>
+            <a:r>
+              <a:rPr lang="en-US" sz="1400" dirty="0" smtClean="0"/>
+              <a:t>2 – default Alt </a:t>
+            </a:r>
+            <a:r>
+              <a:rPr lang="en-US" sz="1400" dirty="0"/>
+              <a:t>Mode =&gt; MSL based</a:t>
+            </a:r>
+          </a:p>
+          <a:p>
+            <a:r>
+              <a:rPr lang="en-US" sz="1400" dirty="0" smtClean="0"/>
+              <a:t>A=</a:t>
+            </a:r>
+            <a:r>
+              <a:rPr lang="en-US" sz="1400" dirty="0" err="1" smtClean="0"/>
+              <a:t>AcftType;MsgRelative;Alt</a:t>
+            </a:r>
+            <a:r>
+              <a:rPr lang="en-US" sz="1400" dirty="0" err="1"/>
+              <a:t>;GS</a:t>
+            </a:r>
+            <a:r>
+              <a:rPr lang="en-US" sz="1400" dirty="0" smtClean="0"/>
+              <a:t>		# </a:t>
+            </a:r>
+            <a:r>
+              <a:rPr lang="en-US" sz="1400" dirty="0"/>
+              <a:t>Type 3 </a:t>
+            </a:r>
+            <a:r>
+              <a:rPr lang="en-US" sz="1400" dirty="0" smtClean="0"/>
+              <a:t>– default </a:t>
+            </a:r>
+            <a:r>
+              <a:rPr lang="en-US" sz="1400" dirty="0"/>
+              <a:t>Alt Mode </a:t>
+            </a:r>
+            <a:r>
+              <a:rPr lang="en-US" sz="1400"/>
+              <a:t>=&gt; </a:t>
+            </a:r>
+            <a:r>
+              <a:rPr lang="en-US" sz="1400"/>
+              <a:t>MSL based</a:t>
+            </a:r>
+            <a:r>
+              <a:rPr lang="en-US" sz="1400" dirty="0" smtClean="0"/>
+              <a:t>; </a:t>
+            </a:r>
+            <a:r>
+              <a:rPr lang="en-US" sz="1400" dirty="0" err="1" smtClean="0"/>
+              <a:t>StartPos</a:t>
+            </a:r>
+            <a:r>
+              <a:rPr lang="en-US" sz="1400" dirty="0" smtClean="0"/>
+              <a:t> </a:t>
+            </a:r>
+            <a:r>
+              <a:rPr lang="en-US" sz="1400" dirty="0"/>
+              <a:t>random; </a:t>
+            </a:r>
+            <a:endParaRPr lang="en-US" sz="1400" dirty="0" smtClean="0"/>
+          </a:p>
+          <a:p>
+            <a:r>
+              <a:rPr lang="en-US" sz="1400" dirty="0" smtClean="0"/>
+              <a:t>A=</a:t>
+            </a:r>
+            <a:r>
+              <a:rPr lang="en-US" sz="1400" dirty="0" err="1" smtClean="0"/>
+              <a:t>AcftType;MsgAbsolute;Alt;GS;Lat;Lon;Hdg</a:t>
+            </a:r>
+            <a:r>
+              <a:rPr lang="en-US" sz="1400" dirty="0"/>
+              <a:t>	# Type 4 </a:t>
+            </a:r>
+            <a:r>
+              <a:rPr lang="en-US" sz="1400" dirty="0" smtClean="0"/>
+              <a:t>– default </a:t>
+            </a:r>
+            <a:r>
+              <a:rPr lang="en-US" sz="1400" dirty="0"/>
+              <a:t>Alt Mode =&gt; MSL </a:t>
+            </a:r>
+            <a:r>
+              <a:rPr lang="en-US" sz="1400" dirty="0" smtClean="0"/>
+              <a:t>based; </a:t>
+            </a:r>
+            <a:r>
+              <a:rPr lang="en-US" sz="1400" dirty="0" err="1" smtClean="0"/>
+              <a:t>StartPos</a:t>
+            </a:r>
+            <a:r>
+              <a:rPr lang="en-US" sz="1400" dirty="0" smtClean="0"/>
+              <a:t> </a:t>
+            </a:r>
+            <a:r>
+              <a:rPr lang="en-US" sz="1400" dirty="0"/>
+              <a:t>defined; </a:t>
+            </a:r>
+          </a:p>
+        </p:txBody>
+      </p:sp>
+      <p:sp>
+        <p:nvSpPr>
+          <p:cNvPr id="7" name="Textfeld 6"/>
           <p:cNvSpPr txBox="1"/>
           <p:nvPr/>
         </p:nvSpPr>
         <p:spPr>
           <a:xfrm>
-            <a:off x="5862484" y="1140094"/>
-            <a:ext cx="6201697" cy="3323987"/>
+            <a:off x="449163" y="5380945"/>
+            <a:ext cx="11342165" cy="1169551"/>
           </a:xfrm>
           <a:prstGeom prst="rect">
             <a:avLst/>
@@ -9158,290 +9111,133 @@
           <a:p>
             <a:r>
               <a:rPr lang="en-US" sz="1400" dirty="0" smtClean="0"/>
-              <a:t>A=</a:t>
-            </a:r>
-            <a:r>
-              <a:rPr lang="de-CH" sz="1400" dirty="0" smtClean="0"/>
-              <a:t>PC6T</a:t>
+              <a:t>Route </a:t>
+            </a:r>
+            <a:r>
+              <a:rPr lang="en-US" sz="1400" dirty="0" err="1" smtClean="0"/>
+              <a:t>Init</a:t>
             </a:r>
             <a:r>
               <a:rPr lang="en-US" sz="1400" dirty="0" smtClean="0"/>
-              <a:t>; LSZH_RW14 # a new PC6, starting at LSZH RWY14</a:t>
+              <a:t>:</a:t>
             </a:r>
           </a:p>
           <a:p>
             <a:r>
               <a:rPr lang="en-US" sz="1400" dirty="0" smtClean="0"/>
-              <a:t>S=95  # </a:t>
+              <a:t>Runway : 		define Start-</a:t>
             </a:r>
             <a:r>
               <a:rPr lang="en-US" sz="1400" dirty="0" err="1" smtClean="0"/>
-              <a:t>init</a:t>
+              <a:t>Pos</a:t>
             </a:r>
             <a:r>
               <a:rPr lang="en-US" sz="1400" dirty="0" smtClean="0"/>
-              <a:t> at 95 </a:t>
+              <a:t>, -Heading, </a:t>
+            </a:r>
+            <a:r>
+              <a:rPr lang="en-US" sz="1400" dirty="0"/>
+              <a:t>-Altitude</a:t>
+            </a:r>
+            <a:r>
+              <a:rPr lang="en-US" sz="1400" dirty="0" smtClean="0"/>
+              <a:t> from Runway record, initial GS zero</a:t>
+            </a:r>
+          </a:p>
+          <a:p>
+            <a:r>
+              <a:rPr lang="en-US" sz="1400" dirty="0" smtClean="0"/>
+              <a:t>Airway: 		define Start-</a:t>
             </a:r>
             <a:r>
               <a:rPr lang="en-US" sz="1400" dirty="0" err="1" smtClean="0"/>
-              <a:t>kts</a:t>
+              <a:t>Pos</a:t>
+            </a:r>
+            <a:r>
+              <a:rPr lang="en-US" sz="1400" dirty="0" smtClean="0"/>
+              <a:t>, -Heading from Airway record, initial -Altitude, -GS are created artificially</a:t>
+            </a:r>
+          </a:p>
+          <a:p>
+            <a:r>
+              <a:rPr lang="en-US" sz="1400" dirty="0" err="1"/>
+              <a:t>MsgRelative</a:t>
+            </a:r>
+            <a:r>
+              <a:rPr lang="en-US" sz="1400" dirty="0" smtClean="0"/>
+              <a:t>:	define Start-</a:t>
+            </a:r>
+            <a:r>
+              <a:rPr lang="en-US" sz="1400" dirty="0" err="1" smtClean="0"/>
+              <a:t>Pos</a:t>
+            </a:r>
+            <a:r>
+              <a:rPr lang="en-US" sz="1400" dirty="0"/>
+              <a:t>, </a:t>
+            </a:r>
+            <a:r>
+              <a:rPr lang="en-US" sz="1400" dirty="0" smtClean="0"/>
+              <a:t>-Heading </a:t>
+            </a:r>
+            <a:r>
+              <a:rPr lang="en-US" sz="1400" dirty="0"/>
+              <a:t>from Runway record, initial </a:t>
+            </a:r>
+            <a:r>
+              <a:rPr lang="en-US" sz="1400" dirty="0" smtClean="0"/>
+              <a:t>-Altitude, -GS from messages </a:t>
+            </a:r>
+            <a:r>
+              <a:rPr lang="en-US" sz="1400" dirty="0"/>
+              <a:t>(</a:t>
+            </a:r>
+            <a:r>
+              <a:rPr lang="en-US" sz="1400" dirty="0" err="1"/>
+              <a:t>CmdA</a:t>
+            </a:r>
+            <a:r>
+              <a:rPr lang="en-US" sz="1400" dirty="0"/>
+              <a:t> props) </a:t>
             </a:r>
             <a:endParaRPr lang="en-US" sz="1400" dirty="0" smtClean="0"/>
           </a:p>
           <a:p>
             <a:r>
+              <a:rPr lang="en-US" sz="1400" dirty="0" err="1" smtClean="0"/>
+              <a:t>MsgAbsolute</a:t>
+            </a:r>
+            <a:r>
+              <a:rPr lang="en-US" sz="1400" dirty="0" smtClean="0"/>
+              <a:t>:	define Start-</a:t>
+            </a:r>
+            <a:r>
+              <a:rPr lang="en-US" sz="1400" dirty="0" err="1" smtClean="0"/>
+              <a:t>Pos</a:t>
+            </a:r>
+            <a:r>
               <a:rPr lang="en-US" sz="1400" dirty="0"/>
-              <a:t>V=1000;500  # for the next segment climb to 500agl@1000ft/min</a:t>
-            </a:r>
-          </a:p>
-          <a:p>
+              <a:t>, </a:t>
+            </a:r>
             <a:r>
               <a:rPr lang="en-US" sz="1400" dirty="0" smtClean="0"/>
-              <a:t>D=2 # straight for 2nm</a:t>
-            </a:r>
-          </a:p>
-          <a:p>
+              <a:t>-Heading, -Altitude, -GS from messages (</a:t>
+            </a:r>
+            <a:r>
+              <a:rPr lang="en-US" sz="1400" dirty="0" err="1" smtClean="0"/>
+              <a:t>CmdA</a:t>
+            </a:r>
             <a:r>
               <a:rPr lang="en-US" sz="1400" dirty="0" smtClean="0"/>
-              <a:t>T=180  # right turn of 180°</a:t>
-            </a:r>
-          </a:p>
-          <a:p>
-            <a:r>
-              <a:rPr lang="en-US" sz="1400" dirty="0" smtClean="0"/>
-              <a:t>V=800;1000  # for the next segment climb to 1000agl@800ft/min</a:t>
-            </a:r>
-          </a:p>
-          <a:p>
-            <a:r>
-              <a:rPr lang="en-US" sz="1400" dirty="0" smtClean="0"/>
-              <a:t>D=10 # straight for 10 nm</a:t>
-            </a:r>
-          </a:p>
-          <a:p>
-            <a:r>
-              <a:rPr lang="en-US" sz="1400" dirty="0" smtClean="0"/>
-              <a:t>S=120 # speed up ; note this is instantaneous (simple model)</a:t>
-            </a:r>
-          </a:p>
-          <a:p>
-            <a:r>
-              <a:rPr lang="en-US" sz="1400" dirty="0" smtClean="0"/>
-              <a:t>V=500;3000  # for the next segment climb to 3000agl@500ft/min</a:t>
-            </a:r>
-          </a:p>
-          <a:p>
-            <a:r>
-              <a:rPr lang="en-US" sz="1400" dirty="0" smtClean="0"/>
-              <a:t>T=-30 # left turn of 30°</a:t>
-            </a:r>
-          </a:p>
-          <a:p>
-            <a:r>
-              <a:rPr lang="en-US" sz="1400" dirty="0" smtClean="0"/>
-              <a:t>D=5 # straight for 5 nm</a:t>
-            </a:r>
-          </a:p>
-          <a:p>
-            <a:r>
-              <a:rPr lang="en-US" sz="1400" dirty="0" smtClean="0"/>
-              <a:t>H=225 # now turn to HDG 225°</a:t>
-            </a:r>
-          </a:p>
-          <a:p>
-            <a:r>
-              <a:rPr lang="en-US" sz="1400" dirty="0" smtClean="0"/>
-              <a:t>D=100 # straight for another 100 nm – just let it fly..</a:t>
-            </a:r>
-          </a:p>
-          <a:p>
-            <a:r>
-              <a:rPr lang="en-US" sz="1400" dirty="0" smtClean="0"/>
-              <a:t>… once the </a:t>
-            </a:r>
-            <a:r>
-              <a:rPr lang="en-US" sz="1400" dirty="0" err="1" smtClean="0"/>
-              <a:t>acft</a:t>
-            </a:r>
-            <a:r>
-              <a:rPr lang="en-US" sz="1400" dirty="0" smtClean="0"/>
-              <a:t> reaches the end of the last segment it will be removed</a:t>
-            </a:r>
-          </a:p>
-          <a:p>
+              <a:t> props)</a:t>
+            </a:r>
             <a:endParaRPr lang="en-US" sz="1400" dirty="0"/>
-          </a:p>
-        </p:txBody>
-      </p:sp>
-      <p:sp>
-        <p:nvSpPr>
-          <p:cNvPr id="13" name="Rechteck 12"/>
-          <p:cNvSpPr/>
-          <p:nvPr/>
-        </p:nvSpPr>
-        <p:spPr>
-          <a:xfrm>
-            <a:off x="294312" y="4000160"/>
-            <a:ext cx="5066725" cy="309150"/>
-          </a:xfrm>
-          <a:prstGeom prst="rect">
-            <a:avLst/>
-          </a:prstGeom>
-        </p:spPr>
-        <p:style>
-          <a:lnRef idx="2">
-            <a:schemeClr val="accent2">
-              <a:shade val="50000"/>
-            </a:schemeClr>
-          </a:lnRef>
-          <a:fillRef idx="1">
-            <a:schemeClr val="accent2"/>
-          </a:fillRef>
-          <a:effectRef idx="0">
-            <a:schemeClr val="accent2"/>
-          </a:effectRef>
-          <a:fontRef idx="minor">
-            <a:schemeClr val="lt1"/>
-          </a:fontRef>
-        </p:style>
-        <p:txBody>
-          <a:bodyPr rtlCol="0" anchor="t"/>
-          <a:lstStyle/>
-          <a:p>
-            <a:r>
-              <a:rPr lang="en-US" sz="1200" dirty="0" smtClean="0"/>
-              <a:t>H=</a:t>
-            </a:r>
-            <a:r>
-              <a:rPr lang="en-US" sz="1200" dirty="0" err="1" smtClean="0"/>
-              <a:t>hdg</a:t>
-            </a:r>
-            <a:r>
-              <a:rPr lang="en-US" sz="1200" dirty="0" smtClean="0"/>
-              <a:t>  # new heading [°] (&lt;=360)</a:t>
-            </a:r>
-            <a:endParaRPr lang="en-US" sz="1200" dirty="0"/>
-          </a:p>
-        </p:txBody>
-      </p:sp>
-      <p:sp>
-        <p:nvSpPr>
-          <p:cNvPr id="14" name="Textfeld 13"/>
-          <p:cNvSpPr txBox="1"/>
-          <p:nvPr/>
-        </p:nvSpPr>
-        <p:spPr>
-          <a:xfrm>
-            <a:off x="5758099" y="769246"/>
-            <a:ext cx="1659193" cy="369332"/>
-          </a:xfrm>
-          <a:prstGeom prst="rect">
-            <a:avLst/>
-          </a:prstGeom>
-          <a:noFill/>
-        </p:spPr>
-        <p:txBody>
-          <a:bodyPr wrap="square" rtlCol="0">
-            <a:spAutoFit/>
-          </a:bodyPr>
-          <a:lstStyle/>
-          <a:p>
-            <a:r>
-              <a:rPr lang="en-US" dirty="0" smtClean="0"/>
-              <a:t>Example Script</a:t>
-            </a:r>
-            <a:endParaRPr lang="en-US" dirty="0"/>
-          </a:p>
-        </p:txBody>
-      </p:sp>
-      <p:sp>
-        <p:nvSpPr>
-          <p:cNvPr id="15" name="Textfeld 14"/>
-          <p:cNvSpPr txBox="1"/>
-          <p:nvPr/>
-        </p:nvSpPr>
-        <p:spPr>
-          <a:xfrm>
-            <a:off x="294312" y="4533047"/>
-            <a:ext cx="7301107" cy="2031325"/>
-          </a:xfrm>
-          <a:prstGeom prst="rect">
-            <a:avLst/>
-          </a:prstGeom>
-          <a:noFill/>
-        </p:spPr>
-        <p:txBody>
-          <a:bodyPr wrap="square" rtlCol="0">
-            <a:spAutoFit/>
-          </a:bodyPr>
-          <a:lstStyle/>
-          <a:p>
-            <a:r>
-              <a:rPr lang="en-US" dirty="0" smtClean="0"/>
-              <a:t>VFR Aircrafts are created from random scripts at random airports within</a:t>
-            </a:r>
-          </a:p>
-          <a:p>
-            <a:r>
-              <a:rPr lang="en-US" dirty="0" smtClean="0"/>
-              <a:t>the observed range, at the start of a random runway using the </a:t>
-            </a:r>
-            <a:r>
-              <a:rPr lang="en-US" dirty="0" err="1" smtClean="0"/>
-              <a:t>rwy</a:t>
-            </a:r>
-            <a:r>
-              <a:rPr lang="en-US" dirty="0" smtClean="0"/>
-              <a:t> heading</a:t>
-            </a:r>
-          </a:p>
-          <a:p>
-            <a:r>
-              <a:rPr lang="en-US" dirty="0" smtClean="0"/>
-              <a:t>The initial altitude (ground level) is given by the runway elevation.</a:t>
-            </a:r>
-          </a:p>
-          <a:p>
-            <a:r>
-              <a:rPr lang="en-US" dirty="0" smtClean="0"/>
-              <a:t>V= command accepts a positive relative altitude (</a:t>
-            </a:r>
-            <a:r>
-              <a:rPr lang="en-US" dirty="0" err="1" smtClean="0"/>
-              <a:t>agl</a:t>
-            </a:r>
-            <a:r>
-              <a:rPr lang="en-US" dirty="0" smtClean="0"/>
-              <a:t>) where the reference is the runway elevation (can still hit rocks though)</a:t>
-            </a:r>
-          </a:p>
-          <a:p>
-            <a:r>
-              <a:rPr lang="en-US" dirty="0" smtClean="0"/>
-              <a:t>Turns are relative to the current track, and start with the </a:t>
-            </a:r>
-            <a:r>
-              <a:rPr lang="en-US" dirty="0" err="1" smtClean="0"/>
-              <a:t>rwy</a:t>
-            </a:r>
-            <a:r>
-              <a:rPr lang="en-US" dirty="0" smtClean="0"/>
-              <a:t> heading</a:t>
-            </a:r>
-          </a:p>
-          <a:p>
-            <a:r>
-              <a:rPr lang="en-US" dirty="0" smtClean="0"/>
-              <a:t>H= command goes to an absolute heading</a:t>
-            </a:r>
-            <a:endParaRPr lang="en-US" dirty="0"/>
           </a:p>
         </p:txBody>
       </p:sp>
     </p:spTree>
     <p:extLst>
       <p:ext uri="{BB962C8B-B14F-4D97-AF65-F5344CB8AC3E}">
-        <p14:creationId xmlns:p14="http://schemas.microsoft.com/office/powerpoint/2010/main" val="1058726595"/>
+        <p14:creationId xmlns:p14="http://schemas.microsoft.com/office/powerpoint/2010/main" val="2601766485"/>
       </p:ext>
     </p:extLst>
   </p:cSld>
@@ -9470,6 +9266,771 @@
       </p:grpSpPr>
       <p:sp>
         <p:nvSpPr>
+          <p:cNvPr id="2" name="Textfeld 1"/>
+          <p:cNvSpPr txBox="1"/>
+          <p:nvPr/>
+        </p:nvSpPr>
+        <p:spPr>
+          <a:xfrm>
+            <a:off x="219541" y="179521"/>
+            <a:ext cx="3259162" cy="369332"/>
+          </a:xfrm>
+          <a:prstGeom prst="rect">
+            <a:avLst/>
+          </a:prstGeom>
+          <a:noFill/>
+        </p:spPr>
+        <p:txBody>
+          <a:bodyPr wrap="none" rtlCol="0">
+            <a:spAutoFit/>
+          </a:bodyPr>
+          <a:lstStyle/>
+          <a:p>
+            <a:r>
+              <a:rPr lang="en-US" dirty="0" smtClean="0"/>
+              <a:t>Virtual Traffic VFR Aircraft Model</a:t>
+            </a:r>
+          </a:p>
+        </p:txBody>
+      </p:sp>
+      <p:sp>
+        <p:nvSpPr>
+          <p:cNvPr id="3" name="Textfeld 2"/>
+          <p:cNvSpPr txBox="1"/>
+          <p:nvPr/>
+        </p:nvSpPr>
+        <p:spPr>
+          <a:xfrm>
+            <a:off x="189929" y="769246"/>
+            <a:ext cx="1659193" cy="369332"/>
+          </a:xfrm>
+          <a:prstGeom prst="rect">
+            <a:avLst/>
+          </a:prstGeom>
+          <a:noFill/>
+        </p:spPr>
+        <p:txBody>
+          <a:bodyPr wrap="square" rtlCol="0">
+            <a:spAutoFit/>
+          </a:bodyPr>
+          <a:lstStyle/>
+          <a:p>
+            <a:r>
+              <a:rPr lang="en-US" dirty="0" smtClean="0"/>
+              <a:t>Commands</a:t>
+            </a:r>
+            <a:endParaRPr lang="en-US" dirty="0"/>
+          </a:p>
+        </p:txBody>
+      </p:sp>
+      <p:sp>
+        <p:nvSpPr>
+          <p:cNvPr id="4" name="Rechteck 3"/>
+          <p:cNvSpPr/>
+          <p:nvPr/>
+        </p:nvSpPr>
+        <p:spPr>
+          <a:xfrm>
+            <a:off x="294313" y="1694092"/>
+            <a:ext cx="5066726" cy="309150"/>
+          </a:xfrm>
+          <a:prstGeom prst="rect">
+            <a:avLst/>
+          </a:prstGeom>
+        </p:spPr>
+        <p:style>
+          <a:lnRef idx="2">
+            <a:schemeClr val="accent6">
+              <a:shade val="50000"/>
+            </a:schemeClr>
+          </a:lnRef>
+          <a:fillRef idx="1">
+            <a:schemeClr val="accent6"/>
+          </a:fillRef>
+          <a:effectRef idx="0">
+            <a:schemeClr val="accent6"/>
+          </a:effectRef>
+          <a:fontRef idx="minor">
+            <a:schemeClr val="lt1"/>
+          </a:fontRef>
+        </p:style>
+        <p:txBody>
+          <a:bodyPr rtlCol="0" anchor="t"/>
+          <a:lstStyle/>
+          <a:p>
+            <a:r>
+              <a:rPr lang="en-US" sz="1200" dirty="0" smtClean="0"/>
+              <a:t>A=</a:t>
+            </a:r>
+            <a:r>
+              <a:rPr lang="en-US" sz="1200" dirty="0" err="1" smtClean="0"/>
+              <a:t>AcftType</a:t>
+            </a:r>
+            <a:r>
+              <a:rPr lang="en-US" sz="1200" dirty="0" smtClean="0"/>
+              <a:t>;[</a:t>
+            </a:r>
+            <a:r>
+              <a:rPr lang="en-US" sz="1200" dirty="0" err="1" smtClean="0"/>
+              <a:t>runway_ID</a:t>
+            </a:r>
+            <a:r>
+              <a:rPr lang="en-US" sz="1200" dirty="0" smtClean="0"/>
+              <a:t>]  # an </a:t>
+            </a:r>
+            <a:r>
+              <a:rPr lang="en-US" sz="1200" dirty="0" err="1" smtClean="0"/>
+              <a:t>acft</a:t>
+            </a:r>
+            <a:r>
+              <a:rPr lang="en-US" sz="1200" dirty="0" smtClean="0"/>
+              <a:t> type and an optional runway id</a:t>
+            </a:r>
+            <a:endParaRPr lang="en-US" sz="1200" dirty="0"/>
+          </a:p>
+        </p:txBody>
+      </p:sp>
+      <p:sp>
+        <p:nvSpPr>
+          <p:cNvPr id="5" name="Rechteck 4"/>
+          <p:cNvSpPr/>
+          <p:nvPr/>
+        </p:nvSpPr>
+        <p:spPr>
+          <a:xfrm>
+            <a:off x="294313" y="2375606"/>
+            <a:ext cx="5066725" cy="309150"/>
+          </a:xfrm>
+          <a:prstGeom prst="rect">
+            <a:avLst/>
+          </a:prstGeom>
+        </p:spPr>
+        <p:style>
+          <a:lnRef idx="2">
+            <a:schemeClr val="accent1">
+              <a:shade val="50000"/>
+            </a:schemeClr>
+          </a:lnRef>
+          <a:fillRef idx="1">
+            <a:schemeClr val="accent1"/>
+          </a:fillRef>
+          <a:effectRef idx="0">
+            <a:schemeClr val="accent1"/>
+          </a:effectRef>
+          <a:fontRef idx="minor">
+            <a:schemeClr val="lt1"/>
+          </a:fontRef>
+        </p:style>
+        <p:txBody>
+          <a:bodyPr rtlCol="0" anchor="t"/>
+          <a:lstStyle/>
+          <a:p>
+            <a:r>
+              <a:rPr lang="en-US" sz="1200" dirty="0" smtClean="0"/>
+              <a:t>S=knots  # new TAS [</a:t>
+            </a:r>
+            <a:r>
+              <a:rPr lang="en-US" sz="1200" dirty="0" err="1" smtClean="0"/>
+              <a:t>kt</a:t>
+            </a:r>
+            <a:r>
+              <a:rPr lang="en-US" sz="1200" dirty="0" smtClean="0"/>
+              <a:t>] </a:t>
+            </a:r>
+            <a:r>
+              <a:rPr lang="en-US" sz="1200" dirty="0"/>
+              <a:t>starting at next </a:t>
+            </a:r>
+            <a:r>
+              <a:rPr lang="en-US" sz="1200" dirty="0" smtClean="0"/>
+              <a:t>segment (default 100kt)</a:t>
+            </a:r>
+            <a:endParaRPr lang="en-US" sz="1200" dirty="0"/>
+          </a:p>
+          <a:p>
+            <a:endParaRPr lang="en-US" sz="1200" dirty="0"/>
+          </a:p>
+        </p:txBody>
+      </p:sp>
+      <p:sp>
+        <p:nvSpPr>
+          <p:cNvPr id="6" name="Rechteck 5"/>
+          <p:cNvSpPr/>
+          <p:nvPr/>
+        </p:nvSpPr>
+        <p:spPr>
+          <a:xfrm>
+            <a:off x="294313" y="3381860"/>
+            <a:ext cx="5066725" cy="309150"/>
+          </a:xfrm>
+          <a:prstGeom prst="rect">
+            <a:avLst/>
+          </a:prstGeom>
+        </p:spPr>
+        <p:style>
+          <a:lnRef idx="2">
+            <a:schemeClr val="accent2">
+              <a:shade val="50000"/>
+            </a:schemeClr>
+          </a:lnRef>
+          <a:fillRef idx="1">
+            <a:schemeClr val="accent2"/>
+          </a:fillRef>
+          <a:effectRef idx="0">
+            <a:schemeClr val="accent2"/>
+          </a:effectRef>
+          <a:fontRef idx="minor">
+            <a:schemeClr val="lt1"/>
+          </a:fontRef>
+        </p:style>
+        <p:txBody>
+          <a:bodyPr rtlCol="0" anchor="t"/>
+          <a:lstStyle/>
+          <a:p>
+            <a:r>
+              <a:rPr lang="en-US" sz="1200" dirty="0" smtClean="0"/>
+              <a:t>D=</a:t>
+            </a:r>
+            <a:r>
+              <a:rPr lang="en-US" sz="1200" dirty="0" err="1" smtClean="0"/>
+              <a:t>dist</a:t>
+            </a:r>
+            <a:r>
+              <a:rPr lang="en-US" sz="1200" dirty="0" smtClean="0"/>
+              <a:t>  # a straight segment [nm]</a:t>
+            </a:r>
+            <a:endParaRPr lang="en-US" sz="1200" dirty="0"/>
+          </a:p>
+        </p:txBody>
+      </p:sp>
+      <p:sp>
+        <p:nvSpPr>
+          <p:cNvPr id="7" name="Rechteck 6"/>
+          <p:cNvSpPr/>
+          <p:nvPr/>
+        </p:nvSpPr>
+        <p:spPr>
+          <a:xfrm>
+            <a:off x="294313" y="3691010"/>
+            <a:ext cx="5066725" cy="309150"/>
+          </a:xfrm>
+          <a:prstGeom prst="rect">
+            <a:avLst/>
+          </a:prstGeom>
+        </p:spPr>
+        <p:style>
+          <a:lnRef idx="2">
+            <a:schemeClr val="accent2">
+              <a:shade val="50000"/>
+            </a:schemeClr>
+          </a:lnRef>
+          <a:fillRef idx="1">
+            <a:schemeClr val="accent2"/>
+          </a:fillRef>
+          <a:effectRef idx="0">
+            <a:schemeClr val="accent2"/>
+          </a:effectRef>
+          <a:fontRef idx="minor">
+            <a:schemeClr val="lt1"/>
+          </a:fontRef>
+        </p:style>
+        <p:txBody>
+          <a:bodyPr rtlCol="0" anchor="t"/>
+          <a:lstStyle/>
+          <a:p>
+            <a:r>
+              <a:rPr lang="en-US" sz="1200" dirty="0" smtClean="0"/>
+              <a:t>T=[+-]angle  # a turn segment [°] (abs &lt;=360)</a:t>
+            </a:r>
+            <a:endParaRPr lang="en-US" sz="1200" dirty="0"/>
+          </a:p>
+        </p:txBody>
+      </p:sp>
+      <p:sp>
+        <p:nvSpPr>
+          <p:cNvPr id="8" name="Rechteck 7"/>
+          <p:cNvSpPr/>
+          <p:nvPr/>
+        </p:nvSpPr>
+        <p:spPr>
+          <a:xfrm>
+            <a:off x="294313" y="2684756"/>
+            <a:ext cx="5066725" cy="309150"/>
+          </a:xfrm>
+          <a:prstGeom prst="rect">
+            <a:avLst/>
+          </a:prstGeom>
+        </p:spPr>
+        <p:style>
+          <a:lnRef idx="2">
+            <a:schemeClr val="accent1">
+              <a:shade val="50000"/>
+            </a:schemeClr>
+          </a:lnRef>
+          <a:fillRef idx="1">
+            <a:schemeClr val="accent1"/>
+          </a:fillRef>
+          <a:effectRef idx="0">
+            <a:schemeClr val="accent1"/>
+          </a:effectRef>
+          <a:fontRef idx="minor">
+            <a:schemeClr val="lt1"/>
+          </a:fontRef>
+        </p:style>
+        <p:txBody>
+          <a:bodyPr rtlCol="0" anchor="t"/>
+          <a:lstStyle/>
+          <a:p>
+            <a:r>
+              <a:rPr lang="en-US" sz="1200" dirty="0" smtClean="0"/>
+              <a:t>V=[+-]</a:t>
+            </a:r>
+            <a:r>
+              <a:rPr lang="en-US" sz="1200" dirty="0" err="1" smtClean="0"/>
+              <a:t>vs;agl</a:t>
+            </a:r>
+            <a:r>
+              <a:rPr lang="en-US" sz="1200" dirty="0" smtClean="0"/>
+              <a:t>  # ascent or descent @vs starting at next segment (</a:t>
+            </a:r>
+            <a:r>
+              <a:rPr lang="en-US" sz="1200" dirty="0" err="1" smtClean="0"/>
+              <a:t>def</a:t>
+            </a:r>
+            <a:r>
+              <a:rPr lang="en-US" sz="1200" dirty="0" smtClean="0"/>
+              <a:t> 0ft/Min)</a:t>
+            </a:r>
+            <a:endParaRPr lang="en-US" sz="1200" dirty="0"/>
+          </a:p>
+        </p:txBody>
+      </p:sp>
+      <p:sp>
+        <p:nvSpPr>
+          <p:cNvPr id="9" name="Textfeld 8"/>
+          <p:cNvSpPr txBox="1"/>
+          <p:nvPr/>
+        </p:nvSpPr>
+        <p:spPr>
+          <a:xfrm>
+            <a:off x="294314" y="1324760"/>
+            <a:ext cx="1659193" cy="369332"/>
+          </a:xfrm>
+          <a:prstGeom prst="rect">
+            <a:avLst/>
+          </a:prstGeom>
+          <a:noFill/>
+        </p:spPr>
+        <p:txBody>
+          <a:bodyPr wrap="square" rtlCol="0">
+            <a:spAutoFit/>
+          </a:bodyPr>
+          <a:lstStyle/>
+          <a:p>
+            <a:r>
+              <a:rPr lang="en-US" dirty="0" smtClean="0"/>
+              <a:t>Create aircraft</a:t>
+            </a:r>
+            <a:endParaRPr lang="en-US" dirty="0"/>
+          </a:p>
+        </p:txBody>
+      </p:sp>
+      <p:sp>
+        <p:nvSpPr>
+          <p:cNvPr id="10" name="Textfeld 9"/>
+          <p:cNvSpPr txBox="1"/>
+          <p:nvPr/>
+        </p:nvSpPr>
+        <p:spPr>
+          <a:xfrm>
+            <a:off x="294313" y="2021864"/>
+            <a:ext cx="1659193" cy="369332"/>
+          </a:xfrm>
+          <a:prstGeom prst="rect">
+            <a:avLst/>
+          </a:prstGeom>
+          <a:noFill/>
+        </p:spPr>
+        <p:txBody>
+          <a:bodyPr wrap="square" rtlCol="0">
+            <a:spAutoFit/>
+          </a:bodyPr>
+          <a:lstStyle/>
+          <a:p>
+            <a:r>
+              <a:rPr lang="en-US" dirty="0" smtClean="0"/>
+              <a:t>Conditions</a:t>
+            </a:r>
+            <a:endParaRPr lang="en-US" dirty="0"/>
+          </a:p>
+        </p:txBody>
+      </p:sp>
+      <p:sp>
+        <p:nvSpPr>
+          <p:cNvPr id="11" name="Textfeld 10"/>
+          <p:cNvSpPr txBox="1"/>
+          <p:nvPr/>
+        </p:nvSpPr>
+        <p:spPr>
+          <a:xfrm>
+            <a:off x="294313" y="3003217"/>
+            <a:ext cx="1659193" cy="369332"/>
+          </a:xfrm>
+          <a:prstGeom prst="rect">
+            <a:avLst/>
+          </a:prstGeom>
+          <a:noFill/>
+        </p:spPr>
+        <p:txBody>
+          <a:bodyPr wrap="square" rtlCol="0">
+            <a:spAutoFit/>
+          </a:bodyPr>
+          <a:lstStyle/>
+          <a:p>
+            <a:r>
+              <a:rPr lang="en-US" dirty="0" smtClean="0"/>
+              <a:t>Segments</a:t>
+            </a:r>
+            <a:endParaRPr lang="en-US" dirty="0"/>
+          </a:p>
+        </p:txBody>
+      </p:sp>
+      <p:sp>
+        <p:nvSpPr>
+          <p:cNvPr id="12" name="Textfeld 11"/>
+          <p:cNvSpPr txBox="1"/>
+          <p:nvPr/>
+        </p:nvSpPr>
+        <p:spPr>
+          <a:xfrm>
+            <a:off x="5862484" y="1140094"/>
+            <a:ext cx="6201697" cy="3323987"/>
+          </a:xfrm>
+          <a:prstGeom prst="rect">
+            <a:avLst/>
+          </a:prstGeom>
+          <a:noFill/>
+        </p:spPr>
+        <p:txBody>
+          <a:bodyPr wrap="square" rtlCol="0">
+            <a:spAutoFit/>
+          </a:bodyPr>
+          <a:lstStyle/>
+          <a:p>
+            <a:r>
+              <a:rPr lang="en-US" sz="1400" dirty="0" smtClean="0"/>
+              <a:t>A=</a:t>
+            </a:r>
+            <a:r>
+              <a:rPr lang="de-CH" sz="1400" dirty="0" smtClean="0"/>
+              <a:t>PC6T</a:t>
+            </a:r>
+            <a:r>
+              <a:rPr lang="en-US" sz="1400" dirty="0" smtClean="0"/>
+              <a:t>; LSZH_RW14 # a new PC6, starting at LSZH RWY14</a:t>
+            </a:r>
+          </a:p>
+          <a:p>
+            <a:r>
+              <a:rPr lang="en-US" sz="1400" dirty="0" smtClean="0"/>
+              <a:t>S=95  # </a:t>
+            </a:r>
+            <a:r>
+              <a:rPr lang="en-US" sz="1400" dirty="0" err="1" smtClean="0"/>
+              <a:t>init</a:t>
+            </a:r>
+            <a:r>
+              <a:rPr lang="en-US" sz="1400" dirty="0" smtClean="0"/>
+              <a:t> at 95 </a:t>
+            </a:r>
+            <a:r>
+              <a:rPr lang="en-US" sz="1400" dirty="0" err="1" smtClean="0"/>
+              <a:t>kts</a:t>
+            </a:r>
+            <a:endParaRPr lang="en-US" sz="1400" dirty="0" smtClean="0"/>
+          </a:p>
+          <a:p>
+            <a:r>
+              <a:rPr lang="en-US" sz="1400" dirty="0"/>
+              <a:t>V=1000;500  # for the next segment climb to 500agl@1000ft/min</a:t>
+            </a:r>
+          </a:p>
+          <a:p>
+            <a:r>
+              <a:rPr lang="en-US" sz="1400" dirty="0" smtClean="0"/>
+              <a:t>D=2 # straight for 2nm</a:t>
+            </a:r>
+          </a:p>
+          <a:p>
+            <a:r>
+              <a:rPr lang="en-US" sz="1400" dirty="0" smtClean="0"/>
+              <a:t>T=180  # right turn of 180°</a:t>
+            </a:r>
+          </a:p>
+          <a:p>
+            <a:r>
+              <a:rPr lang="en-US" sz="1400" dirty="0" smtClean="0"/>
+              <a:t>V=800;1000  # for the next segment climb to 1000agl@800ft/min</a:t>
+            </a:r>
+          </a:p>
+          <a:p>
+            <a:r>
+              <a:rPr lang="en-US" sz="1400" dirty="0" smtClean="0"/>
+              <a:t>D=10 # straight for 10 nm</a:t>
+            </a:r>
+          </a:p>
+          <a:p>
+            <a:r>
+              <a:rPr lang="en-US" sz="1400" dirty="0" smtClean="0"/>
+              <a:t>S=120 # speed up ; note this is instantaneous (simple model)</a:t>
+            </a:r>
+          </a:p>
+          <a:p>
+            <a:r>
+              <a:rPr lang="en-US" sz="1400" dirty="0" smtClean="0"/>
+              <a:t>V=500;3000  # for the next segment climb to 3000agl@500ft/min</a:t>
+            </a:r>
+          </a:p>
+          <a:p>
+            <a:r>
+              <a:rPr lang="en-US" sz="1400" dirty="0" smtClean="0"/>
+              <a:t>T=-30 # left turn of 30°</a:t>
+            </a:r>
+          </a:p>
+          <a:p>
+            <a:r>
+              <a:rPr lang="en-US" sz="1400" dirty="0" smtClean="0"/>
+              <a:t>D=5 # straight for 5 nm</a:t>
+            </a:r>
+          </a:p>
+          <a:p>
+            <a:r>
+              <a:rPr lang="en-US" sz="1400" dirty="0" smtClean="0"/>
+              <a:t>H=225 # now turn to HDG 225°</a:t>
+            </a:r>
+          </a:p>
+          <a:p>
+            <a:r>
+              <a:rPr lang="en-US" sz="1400" dirty="0" smtClean="0"/>
+              <a:t>D=100 # straight for another 100 nm – just let it fly..</a:t>
+            </a:r>
+          </a:p>
+          <a:p>
+            <a:r>
+              <a:rPr lang="en-US" sz="1400" dirty="0" smtClean="0"/>
+              <a:t>… once the </a:t>
+            </a:r>
+            <a:r>
+              <a:rPr lang="en-US" sz="1400" dirty="0" err="1" smtClean="0"/>
+              <a:t>acft</a:t>
+            </a:r>
+            <a:r>
+              <a:rPr lang="en-US" sz="1400" dirty="0" smtClean="0"/>
+              <a:t> reaches the end of the last segment it will be removed</a:t>
+            </a:r>
+          </a:p>
+          <a:p>
+            <a:endParaRPr lang="en-US" sz="1400" dirty="0"/>
+          </a:p>
+        </p:txBody>
+      </p:sp>
+      <p:sp>
+        <p:nvSpPr>
+          <p:cNvPr id="13" name="Rechteck 12"/>
+          <p:cNvSpPr/>
+          <p:nvPr/>
+        </p:nvSpPr>
+        <p:spPr>
+          <a:xfrm>
+            <a:off x="294312" y="4000160"/>
+            <a:ext cx="5066725" cy="309150"/>
+          </a:xfrm>
+          <a:prstGeom prst="rect">
+            <a:avLst/>
+          </a:prstGeom>
+        </p:spPr>
+        <p:style>
+          <a:lnRef idx="2">
+            <a:schemeClr val="accent2">
+              <a:shade val="50000"/>
+            </a:schemeClr>
+          </a:lnRef>
+          <a:fillRef idx="1">
+            <a:schemeClr val="accent2"/>
+          </a:fillRef>
+          <a:effectRef idx="0">
+            <a:schemeClr val="accent2"/>
+          </a:effectRef>
+          <a:fontRef idx="minor">
+            <a:schemeClr val="lt1"/>
+          </a:fontRef>
+        </p:style>
+        <p:txBody>
+          <a:bodyPr rtlCol="0" anchor="t"/>
+          <a:lstStyle/>
+          <a:p>
+            <a:r>
+              <a:rPr lang="en-US" sz="1200" dirty="0" smtClean="0"/>
+              <a:t>H=</a:t>
+            </a:r>
+            <a:r>
+              <a:rPr lang="en-US" sz="1200" dirty="0" err="1" smtClean="0"/>
+              <a:t>hdg</a:t>
+            </a:r>
+            <a:r>
+              <a:rPr lang="en-US" sz="1200" dirty="0" smtClean="0"/>
+              <a:t>  # new heading [°] (&lt;=360)</a:t>
+            </a:r>
+            <a:endParaRPr lang="en-US" sz="1200" dirty="0"/>
+          </a:p>
+        </p:txBody>
+      </p:sp>
+      <p:sp>
+        <p:nvSpPr>
+          <p:cNvPr id="14" name="Textfeld 13"/>
+          <p:cNvSpPr txBox="1"/>
+          <p:nvPr/>
+        </p:nvSpPr>
+        <p:spPr>
+          <a:xfrm>
+            <a:off x="5758099" y="769246"/>
+            <a:ext cx="1659193" cy="369332"/>
+          </a:xfrm>
+          <a:prstGeom prst="rect">
+            <a:avLst/>
+          </a:prstGeom>
+          <a:noFill/>
+        </p:spPr>
+        <p:txBody>
+          <a:bodyPr wrap="square" rtlCol="0">
+            <a:spAutoFit/>
+          </a:bodyPr>
+          <a:lstStyle/>
+          <a:p>
+            <a:r>
+              <a:rPr lang="en-US" dirty="0" smtClean="0"/>
+              <a:t>Example Script</a:t>
+            </a:r>
+            <a:endParaRPr lang="en-US" dirty="0"/>
+          </a:p>
+        </p:txBody>
+      </p:sp>
+      <p:sp>
+        <p:nvSpPr>
+          <p:cNvPr id="15" name="Textfeld 14"/>
+          <p:cNvSpPr txBox="1"/>
+          <p:nvPr/>
+        </p:nvSpPr>
+        <p:spPr>
+          <a:xfrm>
+            <a:off x="294312" y="4533047"/>
+            <a:ext cx="7301107" cy="2031325"/>
+          </a:xfrm>
+          <a:prstGeom prst="rect">
+            <a:avLst/>
+          </a:prstGeom>
+          <a:noFill/>
+        </p:spPr>
+        <p:txBody>
+          <a:bodyPr wrap="square" rtlCol="0">
+            <a:spAutoFit/>
+          </a:bodyPr>
+          <a:lstStyle/>
+          <a:p>
+            <a:r>
+              <a:rPr lang="en-US" dirty="0" smtClean="0"/>
+              <a:t>VFR Aircrafts are created from random scripts at random airports within</a:t>
+            </a:r>
+          </a:p>
+          <a:p>
+            <a:r>
+              <a:rPr lang="en-US" dirty="0" smtClean="0"/>
+              <a:t>the observed range, at the start of a random runway using the </a:t>
+            </a:r>
+            <a:r>
+              <a:rPr lang="en-US" dirty="0" err="1" smtClean="0"/>
+              <a:t>rwy</a:t>
+            </a:r>
+            <a:r>
+              <a:rPr lang="en-US" dirty="0" smtClean="0"/>
+              <a:t> heading</a:t>
+            </a:r>
+          </a:p>
+          <a:p>
+            <a:r>
+              <a:rPr lang="en-US" dirty="0" smtClean="0"/>
+              <a:t>The initial altitude (ground level) is given by the runway elevation.</a:t>
+            </a:r>
+          </a:p>
+          <a:p>
+            <a:r>
+              <a:rPr lang="en-US" dirty="0" smtClean="0"/>
+              <a:t>V= command accepts a positive relative altitude (</a:t>
+            </a:r>
+            <a:r>
+              <a:rPr lang="en-US" dirty="0" err="1" smtClean="0"/>
+              <a:t>agl</a:t>
+            </a:r>
+            <a:r>
+              <a:rPr lang="en-US" dirty="0" smtClean="0"/>
+              <a:t>) where the reference is the runway elevation (can still hit rocks though)</a:t>
+            </a:r>
+          </a:p>
+          <a:p>
+            <a:r>
+              <a:rPr lang="en-US" dirty="0" smtClean="0"/>
+              <a:t>Turns are relative to the current track, and start with the </a:t>
+            </a:r>
+            <a:r>
+              <a:rPr lang="en-US" dirty="0" err="1" smtClean="0"/>
+              <a:t>rwy</a:t>
+            </a:r>
+            <a:r>
+              <a:rPr lang="en-US" dirty="0" smtClean="0"/>
+              <a:t> heading</a:t>
+            </a:r>
+          </a:p>
+          <a:p>
+            <a:r>
+              <a:rPr lang="en-US" dirty="0" smtClean="0"/>
+              <a:t>H= command goes to an absolute heading</a:t>
+            </a:r>
+            <a:endParaRPr lang="en-US" dirty="0"/>
+          </a:p>
+        </p:txBody>
+      </p:sp>
+    </p:spTree>
+    <p:extLst>
+      <p:ext uri="{BB962C8B-B14F-4D97-AF65-F5344CB8AC3E}">
+        <p14:creationId xmlns:p14="http://schemas.microsoft.com/office/powerpoint/2010/main" val="1058726595"/>
+      </p:ext>
+    </p:extLst>
+  </p:cSld>
+  <p:clrMapOvr>
+    <a:masterClrMapping/>
+  </p:clrMapOvr>
+</p:sld>
+</file>
+
+<file path=ppt/slides/slide7.xml><?xml version="1.0" encoding="utf-8"?>
+<p:sld xmlns:a="http://schemas.openxmlformats.org/drawingml/2006/main" xmlns:r="http://schemas.openxmlformats.org/officeDocument/2006/relationships" xmlns:p="http://schemas.openxmlformats.org/presentationml/2006/main">
+  <p:cSld>
+    <p:spTree>
+      <p:nvGrpSpPr>
+        <p:cNvPr id="1" name=""/>
+        <p:cNvGrpSpPr/>
+        <p:nvPr/>
+      </p:nvGrpSpPr>
+      <p:grpSpPr>
+        <a:xfrm>
+          <a:off x="0" y="0"/>
+          <a:ext cx="0" cy="0"/>
+          <a:chOff x="0" y="0"/>
+          <a:chExt cx="0" cy="0"/>
+        </a:xfrm>
+      </p:grpSpPr>
+      <p:sp>
+        <p:nvSpPr>
           <p:cNvPr id="132" name="Textfeld 131"/>
           <p:cNvSpPr txBox="1"/>
           <p:nvPr/>
@@ -11586,7 +12147,7 @@
 </p:sld>
 </file>
 
-<file path=ppt/slides/slide7.xml><?xml version="1.0" encoding="utf-8"?>
+<file path=ppt/slides/slide8.xml><?xml version="1.0" encoding="utf-8"?>
 <p:sld xmlns:a="http://schemas.openxmlformats.org/drawingml/2006/main" xmlns:r="http://schemas.openxmlformats.org/officeDocument/2006/relationships" xmlns:p="http://schemas.openxmlformats.org/presentationml/2006/main">
   <p:cSld>
     <p:spTree>
@@ -12577,7 +13138,7 @@
 </p:sld>
 </file>
 
-<file path=ppt/slides/slide8.xml><?xml version="1.0" encoding="utf-8"?>
+<file path=ppt/slides/slide9.xml><?xml version="1.0" encoding="utf-8"?>
 <p:sld xmlns:a="http://schemas.openxmlformats.org/drawingml/2006/main" xmlns:r="http://schemas.openxmlformats.org/officeDocument/2006/relationships" xmlns:p="http://schemas.openxmlformats.org/presentationml/2006/main">
   <p:cSld>
     <p:spTree>

</xml_diff>